<commit_message>
the rest of the powerpoint is up to you guys
</commit_message>
<xml_diff>
--- a/CSE455_final_project_template.pptx
+++ b/CSE455_final_project_template.pptx
@@ -2169,8 +2169,8 @@
           </p:nvSpPr>
           <p:spPr>
             <a:xfrm>
-              <a:off x="279400" y="450898"/>
-              <a:ext cx="10871200" cy="15696603"/>
+              <a:off x="279400" y="112344"/>
+              <a:ext cx="10871200" cy="16373711"/>
             </a:xfrm>
             <a:prstGeom prst="rect">
               <a:avLst/>
@@ -2320,7 +2320,15 @@
             <a:p>
               <a:r>
                 <a:rPr lang="en-US" dirty="0"/>
-                <a:t>We used our webcam and detected faces from each frame and overlaid a hat where the faces were.</a:t>
+                <a:t>We used our webcam and detected faces from each frame and overlaid a hat where the faces were</a:t>
+              </a:r>
+              <a:r>
+                <a:rPr lang="en-US" dirty="0">
+                  <a:highlight>
+                    <a:srgbClr val="FFFF00"/>
+                  </a:highlight>
+                </a:rPr>
+                <a:t>. [MICHAEL DESCRIBE THIS A BIT MORE]</a:t>
               </a:r>
             </a:p>
             <a:p>
@@ -2493,7 +2501,7 @@
                 </a:spcBef>
                 <a:defRPr sz="4400"/>
               </a:pPr>
-              <a:endParaRPr/>
+              <a:endParaRPr dirty="0"/>
             </a:p>
           </p:txBody>
         </p:sp>
@@ -2505,7 +2513,7 @@
           </p:nvSpPr>
           <p:spPr>
             <a:xfrm>
-              <a:off x="4467225" y="141380"/>
+              <a:off x="1520825" y="471580"/>
               <a:ext cx="2514600" cy="769439"/>
             </a:xfrm>
             <a:prstGeom prst="rect">
@@ -2541,14 +2549,14 @@
               </a:lvl1pPr>
             </a:lstStyle>
             <a:p>
-              <a:pPr marL="0" indent="0">
+              <a:pPr marL="0" indent="0" algn="ctr">
                 <a:buNone/>
               </a:pPr>
               <a:r>
-                <a:rPr lang="en-US" dirty="0"/>
-                <a:t>Beginning</a:t>
+                <a:rPr lang="en-US" i="1" dirty="0"/>
+                <a:t>Before</a:t>
               </a:r>
-              <a:endParaRPr dirty="0"/>
+              <a:endParaRPr i="1" dirty="0"/>
             </a:p>
           </p:txBody>
         </p:sp>
@@ -2690,10 +2698,50 @@
           </a:ln>
         </p:spPr>
         <p:txBody>
-          <a:bodyPr lIns="45719" rIns="45719" anchor="ctr"/>
+          <a:bodyPr lIns="45719" rIns="45719" anchor="t"/>
           <a:lstStyle/>
           <a:p>
             <a:pPr marL="571500" indent="-571500">
+              <a:buFont typeface="Arial" panose="020B0604020202020204" pitchFamily="34" charset="0"/>
+              <a:buChar char="•"/>
+              <a:defRPr sz="4400"/>
+            </a:pPr>
+            <a:r>
+              <a:rPr lang="en-US" sz="4400" b="1" dirty="0"/>
+              <a:t>Facial mapping (landmarks) with </a:t>
+            </a:r>
+            <a:r>
+              <a:rPr lang="en-US" sz="4400" b="1" dirty="0" err="1"/>
+              <a:t>Dlib</a:t>
+            </a:r>
+            <a:r>
+              <a:rPr lang="en-US" sz="4400" b="1" dirty="0"/>
+              <a:t> + python </a:t>
+            </a:r>
+            <a:r>
+              <a:rPr lang="en-US" sz="4400" dirty="0"/>
+              <a:t>by Italo José</a:t>
+            </a:r>
+          </a:p>
+          <a:p>
+            <a:pPr marL="571500" indent="-571500">
+              <a:buFont typeface="Arial" panose="020B0604020202020204" pitchFamily="34" charset="0"/>
+              <a:buChar char="•"/>
+              <a:defRPr sz="4400"/>
+            </a:pPr>
+            <a:r>
+              <a:rPr lang="en-US" sz="4400" dirty="0">
+                <a:highlight>
+                  <a:srgbClr val="FFFF00"/>
+                </a:highlight>
+              </a:rPr>
+              <a:t>[FILL THIS PART OUT]</a:t>
+            </a:r>
+          </a:p>
+          <a:p>
+            <a:pPr marL="571500" indent="-571500">
+              <a:buFont typeface="Arial" panose="020B0604020202020204" pitchFamily="34" charset="0"/>
+              <a:buChar char="•"/>
               <a:defRPr sz="4400"/>
             </a:pPr>
             <a:endParaRPr dirty="0"/>
@@ -3573,6 +3621,553 @@
           </a:extLst>
         </p:spPr>
       </p:pic>
+      <p:pic>
+        <p:nvPicPr>
+          <p:cNvPr id="3" name="Picture 2" descr="A purple hat&#10;&#10;Description automatically generated">
+            <a:extLst>
+              <a:ext uri="{FF2B5EF4-FFF2-40B4-BE49-F238E27FC236}">
+                <a16:creationId xmlns:a16="http://schemas.microsoft.com/office/drawing/2014/main" id="{B4E79664-990A-4463-B235-4AA0D1D2AE89}"/>
+              </a:ext>
+            </a:extLst>
+          </p:cNvPr>
+          <p:cNvPicPr>
+            <a:picLocks noChangeAspect="1"/>
+          </p:cNvPicPr>
+          <p:nvPr/>
+        </p:nvPicPr>
+        <p:blipFill>
+          <a:blip r:embed="rId8">
+            <a:extLst>
+              <a:ext uri="{28A0092B-C50C-407E-A947-70E740481C1C}">
+                <a14:useLocalDpi xmlns:a14="http://schemas.microsoft.com/office/drawing/2010/main" val="0"/>
+              </a:ext>
+            </a:extLst>
+          </a:blip>
+          <a:stretch>
+            <a:fillRect/>
+          </a:stretch>
+        </p:blipFill>
+        <p:spPr>
+          <a:xfrm>
+            <a:off x="4460686" y="518972"/>
+            <a:ext cx="2705478" cy="2010056"/>
+          </a:xfrm>
+          <a:prstGeom prst="rect">
+            <a:avLst/>
+          </a:prstGeom>
+        </p:spPr>
+      </p:pic>
+      <p:pic>
+        <p:nvPicPr>
+          <p:cNvPr id="68" name="Picture 67">
+            <a:extLst>
+              <a:ext uri="{FF2B5EF4-FFF2-40B4-BE49-F238E27FC236}">
+                <a16:creationId xmlns:a16="http://schemas.microsoft.com/office/drawing/2014/main" id="{EB658318-5603-445B-B2B1-8796B8FDB1BE}"/>
+              </a:ext>
+            </a:extLst>
+          </p:cNvPr>
+          <p:cNvPicPr>
+            <a:picLocks noChangeAspect="1"/>
+          </p:cNvPicPr>
+          <p:nvPr/>
+        </p:nvPicPr>
+        <p:blipFill>
+          <a:blip r:embed="rId8">
+            <a:extLst>
+              <a:ext uri="{28A0092B-C50C-407E-A947-70E740481C1C}">
+                <a14:useLocalDpi xmlns:a14="http://schemas.microsoft.com/office/drawing/2010/main" val="0"/>
+              </a:ext>
+            </a:extLst>
+          </a:blip>
+          <a:stretch>
+            <a:fillRect/>
+          </a:stretch>
+        </p:blipFill>
+        <p:spPr>
+          <a:xfrm flipH="1">
+            <a:off x="16297463" y="479285"/>
+            <a:ext cx="2705477" cy="2010056"/>
+          </a:xfrm>
+          <a:prstGeom prst="rect">
+            <a:avLst/>
+          </a:prstGeom>
+        </p:spPr>
+      </p:pic>
+      <p:sp>
+        <p:nvSpPr>
+          <p:cNvPr id="69" name="Shape 45">
+            <a:extLst>
+              <a:ext uri="{FF2B5EF4-FFF2-40B4-BE49-F238E27FC236}">
+                <a16:creationId xmlns:a16="http://schemas.microsoft.com/office/drawing/2014/main" id="{5782A1BF-B0C8-473A-B18F-54C2CBDC2733}"/>
+              </a:ext>
+            </a:extLst>
+          </p:cNvPr>
+          <p:cNvSpPr/>
+          <p:nvPr/>
+        </p:nvSpPr>
+        <p:spPr>
+          <a:xfrm>
+            <a:off x="31930975" y="6330182"/>
+            <a:ext cx="2514600" cy="769439"/>
+          </a:xfrm>
+          <a:prstGeom prst="rect">
+            <a:avLst/>
+          </a:prstGeom>
+          <a:noFill/>
+          <a:ln w="12700" cap="flat">
+            <a:noFill/>
+            <a:miter lim="400000"/>
+          </a:ln>
+          <a:effectLst/>
+          <a:extLst>
+            <a:ext uri="{C572A759-6A51-4108-AA02-DFA0A04FC94B}">
+              <ma14:wrappingTextBoxFlag xmlns:ma14="http://schemas.microsoft.com/office/mac/drawingml/2011/main" xmlns="" val="1"/>
+            </a:ext>
+          </a:extLst>
+        </p:spPr>
+        <p:txBody>
+          <a:bodyPr wrap="square" lIns="45719" tIns="45719" rIns="45719" bIns="45719" numCol="1" anchor="ctr">
+            <a:spAutoFit/>
+          </a:bodyPr>
+          <a:lstStyle>
+            <a:lvl1pPr marL="571500" indent="-571500" defTabSz="4387850">
+              <a:spcBef>
+                <a:spcPts val="1200"/>
+              </a:spcBef>
+              <a:buClr>
+                <a:srgbClr val="A6A6A6"/>
+              </a:buClr>
+              <a:buSzPct val="100000"/>
+              <a:buChar char="•"/>
+              <a:defRPr sz="4400"/>
+            </a:lvl1pPr>
+          </a:lstStyle>
+          <a:p>
+            <a:pPr marL="0" indent="0" algn="ctr">
+              <a:buNone/>
+            </a:pPr>
+            <a:r>
+              <a:rPr lang="en-US" i="1" dirty="0"/>
+              <a:t>After</a:t>
+            </a:r>
+            <a:endParaRPr i="1" dirty="0"/>
+          </a:p>
+        </p:txBody>
+      </p:sp>
+      <p:pic>
+        <p:nvPicPr>
+          <p:cNvPr id="5" name="Picture 4" descr="A close up of a person&#10;&#10;Description automatically generated">
+            <a:extLst>
+              <a:ext uri="{FF2B5EF4-FFF2-40B4-BE49-F238E27FC236}">
+                <a16:creationId xmlns:a16="http://schemas.microsoft.com/office/drawing/2014/main" id="{EA9C2648-E3C6-4F50-97F1-45643F63FE16}"/>
+              </a:ext>
+            </a:extLst>
+          </p:cNvPr>
+          <p:cNvPicPr>
+            <a:picLocks noChangeAspect="1"/>
+          </p:cNvPicPr>
+          <p:nvPr/>
+        </p:nvPicPr>
+        <p:blipFill>
+          <a:blip r:embed="rId9">
+            <a:extLst>
+              <a:ext uri="{28A0092B-C50C-407E-A947-70E740481C1C}">
+                <a14:useLocalDpi xmlns:a14="http://schemas.microsoft.com/office/drawing/2010/main" val="0"/>
+              </a:ext>
+            </a:extLst>
+          </a:blip>
+          <a:stretch>
+            <a:fillRect/>
+          </a:stretch>
+        </p:blipFill>
+        <p:spPr>
+          <a:xfrm>
+            <a:off x="25077493" y="7104838"/>
+            <a:ext cx="5240582" cy="2954651"/>
+          </a:xfrm>
+          <a:prstGeom prst="rect">
+            <a:avLst/>
+          </a:prstGeom>
+        </p:spPr>
+      </p:pic>
+      <p:sp>
+        <p:nvSpPr>
+          <p:cNvPr id="70" name="Shape 45">
+            <a:extLst>
+              <a:ext uri="{FF2B5EF4-FFF2-40B4-BE49-F238E27FC236}">
+                <a16:creationId xmlns:a16="http://schemas.microsoft.com/office/drawing/2014/main" id="{42572B85-6BA6-49D9-8BAD-36351047DD5D}"/>
+              </a:ext>
+            </a:extLst>
+          </p:cNvPr>
+          <p:cNvSpPr/>
+          <p:nvPr/>
+        </p:nvSpPr>
+        <p:spPr>
+          <a:xfrm>
+            <a:off x="29098875" y="5953449"/>
+            <a:ext cx="2514600" cy="769439"/>
+          </a:xfrm>
+          <a:prstGeom prst="rect">
+            <a:avLst/>
+          </a:prstGeom>
+          <a:noFill/>
+          <a:ln w="12700" cap="flat">
+            <a:noFill/>
+            <a:miter lim="400000"/>
+          </a:ln>
+          <a:effectLst/>
+          <a:extLst>
+            <a:ext uri="{C572A759-6A51-4108-AA02-DFA0A04FC94B}">
+              <ma14:wrappingTextBoxFlag xmlns:ma14="http://schemas.microsoft.com/office/mac/drawingml/2011/main" xmlns="" val="1"/>
+            </a:ext>
+          </a:extLst>
+        </p:spPr>
+        <p:txBody>
+          <a:bodyPr wrap="square" lIns="45719" tIns="45719" rIns="45719" bIns="45719" numCol="1" anchor="ctr">
+            <a:spAutoFit/>
+          </a:bodyPr>
+          <a:lstStyle>
+            <a:lvl1pPr marL="571500" indent="-571500" defTabSz="4387850">
+              <a:spcBef>
+                <a:spcPts val="1200"/>
+              </a:spcBef>
+              <a:buClr>
+                <a:srgbClr val="A6A6A6"/>
+              </a:buClr>
+              <a:buSzPct val="100000"/>
+              <a:buChar char="•"/>
+              <a:defRPr sz="4400"/>
+            </a:lvl1pPr>
+          </a:lstStyle>
+          <a:p>
+            <a:pPr marL="0" indent="0" algn="ctr">
+              <a:buNone/>
+            </a:pPr>
+            <a:r>
+              <a:rPr lang="en-US" b="1" u="sng" dirty="0"/>
+              <a:t>Images</a:t>
+            </a:r>
+            <a:endParaRPr b="1" u="sng" dirty="0"/>
+          </a:p>
+        </p:txBody>
+      </p:sp>
+      <p:pic>
+        <p:nvPicPr>
+          <p:cNvPr id="7" name="Picture 6" descr="A person wearing a hat&#10;&#10;Description automatically generated">
+            <a:extLst>
+              <a:ext uri="{FF2B5EF4-FFF2-40B4-BE49-F238E27FC236}">
+                <a16:creationId xmlns:a16="http://schemas.microsoft.com/office/drawing/2014/main" id="{8DD7FAF3-BCC5-45BC-824A-73F9FEFF36ED}"/>
+              </a:ext>
+            </a:extLst>
+          </p:cNvPr>
+          <p:cNvPicPr>
+            <a:picLocks noChangeAspect="1"/>
+          </p:cNvPicPr>
+          <p:nvPr/>
+        </p:nvPicPr>
+        <p:blipFill>
+          <a:blip r:embed="rId10">
+            <a:extLst>
+              <a:ext uri="{28A0092B-C50C-407E-A947-70E740481C1C}">
+                <a14:useLocalDpi xmlns:a14="http://schemas.microsoft.com/office/drawing/2010/main" val="0"/>
+              </a:ext>
+            </a:extLst>
+          </a:blip>
+          <a:stretch>
+            <a:fillRect/>
+          </a:stretch>
+        </p:blipFill>
+        <p:spPr>
+          <a:xfrm>
+            <a:off x="30598819" y="7099621"/>
+            <a:ext cx="5240581" cy="2954650"/>
+          </a:xfrm>
+          <a:prstGeom prst="rect">
+            <a:avLst/>
+          </a:prstGeom>
+        </p:spPr>
+      </p:pic>
+      <p:pic>
+        <p:nvPicPr>
+          <p:cNvPr id="9" name="Picture 8" descr="A person posing for a picture&#10;&#10;Description automatically generated">
+            <a:extLst>
+              <a:ext uri="{FF2B5EF4-FFF2-40B4-BE49-F238E27FC236}">
+                <a16:creationId xmlns:a16="http://schemas.microsoft.com/office/drawing/2014/main" id="{CEA54A6E-AC33-4D84-BA74-E546BEE9F7EF}"/>
+              </a:ext>
+            </a:extLst>
+          </p:cNvPr>
+          <p:cNvPicPr>
+            <a:picLocks noChangeAspect="1"/>
+          </p:cNvPicPr>
+          <p:nvPr/>
+        </p:nvPicPr>
+        <p:blipFill>
+          <a:blip r:embed="rId11">
+            <a:extLst>
+              <a:ext uri="{28A0092B-C50C-407E-A947-70E740481C1C}">
+                <a14:useLocalDpi xmlns:a14="http://schemas.microsoft.com/office/drawing/2010/main" val="0"/>
+              </a:ext>
+            </a:extLst>
+          </a:blip>
+          <a:stretch>
+            <a:fillRect/>
+          </a:stretch>
+        </p:blipFill>
+        <p:spPr>
+          <a:xfrm>
+            <a:off x="25077492" y="10137006"/>
+            <a:ext cx="5247005" cy="2623503"/>
+          </a:xfrm>
+          <a:prstGeom prst="rect">
+            <a:avLst/>
+          </a:prstGeom>
+        </p:spPr>
+      </p:pic>
+      <p:pic>
+        <p:nvPicPr>
+          <p:cNvPr id="11" name="Picture 10" descr="A person wearing a hat&#10;&#10;Description automatically generated">
+            <a:extLst>
+              <a:ext uri="{FF2B5EF4-FFF2-40B4-BE49-F238E27FC236}">
+                <a16:creationId xmlns:a16="http://schemas.microsoft.com/office/drawing/2014/main" id="{F87F86CE-238B-492B-A907-A979628E3B55}"/>
+              </a:ext>
+            </a:extLst>
+          </p:cNvPr>
+          <p:cNvPicPr>
+            <a:picLocks noChangeAspect="1"/>
+          </p:cNvPicPr>
+          <p:nvPr/>
+        </p:nvPicPr>
+        <p:blipFill>
+          <a:blip r:embed="rId12">
+            <a:extLst>
+              <a:ext uri="{28A0092B-C50C-407E-A947-70E740481C1C}">
+                <a14:useLocalDpi xmlns:a14="http://schemas.microsoft.com/office/drawing/2010/main" val="0"/>
+              </a:ext>
+            </a:extLst>
+          </a:blip>
+          <a:stretch>
+            <a:fillRect/>
+          </a:stretch>
+        </p:blipFill>
+        <p:spPr>
+          <a:xfrm>
+            <a:off x="30592394" y="10134292"/>
+            <a:ext cx="5247006" cy="2623503"/>
+          </a:xfrm>
+          <a:prstGeom prst="rect">
+            <a:avLst/>
+          </a:prstGeom>
+        </p:spPr>
+      </p:pic>
+      <p:sp>
+        <p:nvSpPr>
+          <p:cNvPr id="71" name="Shape 45">
+            <a:extLst>
+              <a:ext uri="{FF2B5EF4-FFF2-40B4-BE49-F238E27FC236}">
+                <a16:creationId xmlns:a16="http://schemas.microsoft.com/office/drawing/2014/main" id="{4655FCE3-EC21-4AFD-B265-AAC29E36AD78}"/>
+              </a:ext>
+            </a:extLst>
+          </p:cNvPr>
+          <p:cNvSpPr/>
+          <p:nvPr/>
+        </p:nvSpPr>
+        <p:spPr>
+          <a:xfrm>
+            <a:off x="29098875" y="12819069"/>
+            <a:ext cx="2514600" cy="769439"/>
+          </a:xfrm>
+          <a:prstGeom prst="rect">
+            <a:avLst/>
+          </a:prstGeom>
+          <a:noFill/>
+          <a:ln w="12700" cap="flat">
+            <a:noFill/>
+            <a:miter lim="400000"/>
+          </a:ln>
+          <a:effectLst/>
+          <a:extLst>
+            <a:ext uri="{C572A759-6A51-4108-AA02-DFA0A04FC94B}">
+              <ma14:wrappingTextBoxFlag xmlns:ma14="http://schemas.microsoft.com/office/mac/drawingml/2011/main" xmlns="" val="1"/>
+            </a:ext>
+          </a:extLst>
+        </p:spPr>
+        <p:txBody>
+          <a:bodyPr wrap="square" lIns="45719" tIns="45719" rIns="45719" bIns="45719" numCol="1" anchor="ctr">
+            <a:spAutoFit/>
+          </a:bodyPr>
+          <a:lstStyle>
+            <a:lvl1pPr marL="571500" indent="-571500" defTabSz="4387850">
+              <a:spcBef>
+                <a:spcPts val="1200"/>
+              </a:spcBef>
+              <a:buClr>
+                <a:srgbClr val="A6A6A6"/>
+              </a:buClr>
+              <a:buSzPct val="100000"/>
+              <a:buChar char="•"/>
+              <a:defRPr sz="4400"/>
+            </a:lvl1pPr>
+          </a:lstStyle>
+          <a:p>
+            <a:pPr marL="0" indent="0" algn="ctr">
+              <a:buNone/>
+            </a:pPr>
+            <a:r>
+              <a:rPr lang="en-US" b="1" u="sng" dirty="0"/>
+              <a:t>Video</a:t>
+            </a:r>
+            <a:endParaRPr b="1" u="sng" dirty="0"/>
+          </a:p>
+        </p:txBody>
+      </p:sp>
+      <p:sp>
+        <p:nvSpPr>
+          <p:cNvPr id="14" name="TextBox 13">
+            <a:extLst>
+              <a:ext uri="{FF2B5EF4-FFF2-40B4-BE49-F238E27FC236}">
+                <a16:creationId xmlns:a16="http://schemas.microsoft.com/office/drawing/2014/main" id="{443FE7D0-EEA0-4AC4-887F-C6A3F0CE5AEA}"/>
+              </a:ext>
+            </a:extLst>
+          </p:cNvPr>
+          <p:cNvSpPr txBox="1"/>
+          <p:nvPr/>
+        </p:nvSpPr>
+        <p:spPr>
+          <a:xfrm>
+            <a:off x="26198164" y="15483514"/>
+            <a:ext cx="9349136" cy="4524313"/>
+          </a:xfrm>
+          <a:prstGeom prst="rect">
+            <a:avLst/>
+          </a:prstGeom>
+          <a:noFill/>
+          <a:ln w="12700" cap="flat">
+            <a:noFill/>
+            <a:miter lim="400000"/>
+          </a:ln>
+          <a:effectLst/>
+          <a:sp3d/>
+        </p:spPr>
+        <p:style>
+          <a:lnRef idx="0">
+            <a:scrgbClr r="0" g="0" b="0"/>
+          </a:lnRef>
+          <a:fillRef idx="0">
+            <a:scrgbClr r="0" g="0" b="0"/>
+          </a:fillRef>
+          <a:effectRef idx="0">
+            <a:scrgbClr r="0" g="0" b="0"/>
+          </a:effectRef>
+          <a:fontRef idx="none"/>
+        </p:style>
+        <p:txBody>
+          <a:bodyPr rot="0" spcFirstLastPara="1" vertOverflow="overflow" horzOverflow="overflow" vert="horz" wrap="square" lIns="45719" tIns="45719" rIns="45719" bIns="45719" numCol="1" spcCol="38100" rtlCol="0" anchor="t">
+            <a:spAutoFit/>
+          </a:bodyPr>
+          <a:lstStyle/>
+          <a:p>
+            <a:pPr marL="0" marR="0" indent="0" algn="l" defTabSz="914400" rtl="0" fontAlgn="auto" latinLnBrk="0" hangingPunct="0">
+              <a:lnSpc>
+                <a:spcPct val="100000"/>
+              </a:lnSpc>
+              <a:spcBef>
+                <a:spcPts val="0"/>
+              </a:spcBef>
+              <a:spcAft>
+                <a:spcPts val="0"/>
+              </a:spcAft>
+              <a:buClrTx/>
+              <a:buSzTx/>
+              <a:buFontTx/>
+              <a:buNone/>
+              <a:tabLst/>
+            </a:pPr>
+            <a:r>
+              <a:rPr kumimoji="0" lang="en-US" sz="7200" b="0" i="0" u="none" strike="noStrike" cap="none" spc="0" normalizeH="0" baseline="0" dirty="0">
+                <a:ln>
+                  <a:noFill/>
+                </a:ln>
+                <a:solidFill>
+                  <a:srgbClr val="000000"/>
+                </a:solidFill>
+                <a:effectLst/>
+                <a:highlight>
+                  <a:srgbClr val="FFFF00"/>
+                </a:highlight>
+                <a:uFillTx/>
+                <a:latin typeface="Times New Roman"/>
+                <a:ea typeface="Times New Roman"/>
+                <a:cs typeface="Times New Roman"/>
+                <a:sym typeface="Times New Roman"/>
+              </a:rPr>
+              <a:t>[PUT SCREENSHOTS HERE] </a:t>
+            </a:r>
+          </a:p>
+          <a:p>
+            <a:pPr marL="0" marR="0" indent="0" algn="l" defTabSz="914400" rtl="0" fontAlgn="auto" latinLnBrk="0" hangingPunct="0">
+              <a:lnSpc>
+                <a:spcPct val="100000"/>
+              </a:lnSpc>
+              <a:spcBef>
+                <a:spcPts val="0"/>
+              </a:spcBef>
+              <a:spcAft>
+                <a:spcPts val="0"/>
+              </a:spcAft>
+              <a:buClrTx/>
+              <a:buSzTx/>
+              <a:buFontTx/>
+              <a:buNone/>
+              <a:tabLst/>
+            </a:pPr>
+            <a:r>
+              <a:rPr lang="en-US">
+                <a:highlight>
+                  <a:srgbClr val="FFFF00"/>
+                </a:highlight>
+              </a:rPr>
+              <a:t>[</a:t>
+            </a:r>
+            <a:r>
+              <a:rPr kumimoji="0" lang="en-US" sz="7200" b="0" i="0" u="none" strike="noStrike" cap="none" spc="0" normalizeH="0" baseline="0">
+                <a:ln>
+                  <a:noFill/>
+                </a:ln>
+                <a:solidFill>
+                  <a:srgbClr val="000000"/>
+                </a:solidFill>
+                <a:effectLst/>
+                <a:highlight>
+                  <a:srgbClr val="FFFF00"/>
+                </a:highlight>
+                <a:uFillTx/>
+                <a:latin typeface="Times New Roman"/>
+                <a:ea typeface="Times New Roman"/>
+                <a:cs typeface="Times New Roman"/>
+                <a:sym typeface="Times New Roman"/>
+              </a:rPr>
+              <a:t>ALSO READ OVER THINGS]</a:t>
+            </a:r>
+            <a:endParaRPr kumimoji="0" lang="en-US" sz="7200" b="0" i="0" u="none" strike="noStrike" cap="none" spc="0" normalizeH="0" baseline="0" dirty="0">
+              <a:ln>
+                <a:noFill/>
+              </a:ln>
+              <a:solidFill>
+                <a:srgbClr val="000000"/>
+              </a:solidFill>
+              <a:effectLst/>
+              <a:highlight>
+                <a:srgbClr val="FFFF00"/>
+              </a:highlight>
+              <a:uFillTx/>
+              <a:latin typeface="Times New Roman"/>
+              <a:ea typeface="Times New Roman"/>
+              <a:cs typeface="Times New Roman"/>
+              <a:sym typeface="Times New Roman"/>
+            </a:endParaRPr>
+          </a:p>
+        </p:txBody>
+      </p:sp>
     </p:spTree>
   </p:cSld>
   <p:clrMapOvr>

</xml_diff>